<commit_message>
Color coded composition operator
</commit_message>
<xml_diff>
--- a/docs/paper/graphics/protocol-composition.pptx
+++ b/docs/paper/graphics/protocol-composition.pptx
@@ -197,7 +197,7 @@
           <a:p>
             <a:fld id="{2EEA6F30-0CB3-4940-BF8E-C464E60C54BE}" type="datetimeFigureOut">
               <a:rPr lang="en-US" smtClean="0"/>
-              <a:t>11/8/18</a:t>
+              <a:t>11/16/18</a:t>
             </a:fld>
             <a:endParaRPr lang="en-US"/>
           </a:p>
@@ -680,7 +680,7 @@
           <a:p>
             <a:fld id="{98A996D5-9536-4841-A147-9AD88C6446A0}" type="datetimeFigureOut">
               <a:rPr lang="en-US" smtClean="0"/>
-              <a:t>11/8/18</a:t>
+              <a:t>11/16/18</a:t>
             </a:fld>
             <a:endParaRPr lang="en-US"/>
           </a:p>
@@ -850,7 +850,7 @@
           <a:p>
             <a:fld id="{98A996D5-9536-4841-A147-9AD88C6446A0}" type="datetimeFigureOut">
               <a:rPr lang="en-US" smtClean="0"/>
-              <a:t>11/8/18</a:t>
+              <a:t>11/16/18</a:t>
             </a:fld>
             <a:endParaRPr lang="en-US"/>
           </a:p>
@@ -1030,7 +1030,7 @@
           <a:p>
             <a:fld id="{98A996D5-9536-4841-A147-9AD88C6446A0}" type="datetimeFigureOut">
               <a:rPr lang="en-US" smtClean="0"/>
-              <a:t>11/8/18</a:t>
+              <a:t>11/16/18</a:t>
             </a:fld>
             <a:endParaRPr lang="en-US"/>
           </a:p>
@@ -1200,7 +1200,7 @@
           <a:p>
             <a:fld id="{98A996D5-9536-4841-A147-9AD88C6446A0}" type="datetimeFigureOut">
               <a:rPr lang="en-US" smtClean="0"/>
-              <a:t>11/8/18</a:t>
+              <a:t>11/16/18</a:t>
             </a:fld>
             <a:endParaRPr lang="en-US"/>
           </a:p>
@@ -1446,7 +1446,7 @@
           <a:p>
             <a:fld id="{98A996D5-9536-4841-A147-9AD88C6446A0}" type="datetimeFigureOut">
               <a:rPr lang="en-US" smtClean="0"/>
-              <a:t>11/8/18</a:t>
+              <a:t>11/16/18</a:t>
             </a:fld>
             <a:endParaRPr lang="en-US"/>
           </a:p>
@@ -1678,7 +1678,7 @@
           <a:p>
             <a:fld id="{98A996D5-9536-4841-A147-9AD88C6446A0}" type="datetimeFigureOut">
               <a:rPr lang="en-US" smtClean="0"/>
-              <a:t>11/8/18</a:t>
+              <a:t>11/16/18</a:t>
             </a:fld>
             <a:endParaRPr lang="en-US"/>
           </a:p>
@@ -2045,7 +2045,7 @@
           <a:p>
             <a:fld id="{98A996D5-9536-4841-A147-9AD88C6446A0}" type="datetimeFigureOut">
               <a:rPr lang="en-US" smtClean="0"/>
-              <a:t>11/8/18</a:t>
+              <a:t>11/16/18</a:t>
             </a:fld>
             <a:endParaRPr lang="en-US"/>
           </a:p>
@@ -2163,7 +2163,7 @@
           <a:p>
             <a:fld id="{98A996D5-9536-4841-A147-9AD88C6446A0}" type="datetimeFigureOut">
               <a:rPr lang="en-US" smtClean="0"/>
-              <a:t>11/8/18</a:t>
+              <a:t>11/16/18</a:t>
             </a:fld>
             <a:endParaRPr lang="en-US"/>
           </a:p>
@@ -2258,7 +2258,7 @@
           <a:p>
             <a:fld id="{98A996D5-9536-4841-A147-9AD88C6446A0}" type="datetimeFigureOut">
               <a:rPr lang="en-US" smtClean="0"/>
-              <a:t>11/8/18</a:t>
+              <a:t>11/16/18</a:t>
             </a:fld>
             <a:endParaRPr lang="en-US"/>
           </a:p>
@@ -2535,7 +2535,7 @@
           <a:p>
             <a:fld id="{98A996D5-9536-4841-A147-9AD88C6446A0}" type="datetimeFigureOut">
               <a:rPr lang="en-US" smtClean="0"/>
-              <a:t>11/8/18</a:t>
+              <a:t>11/16/18</a:t>
             </a:fld>
             <a:endParaRPr lang="en-US"/>
           </a:p>
@@ -2788,7 +2788,7 @@
           <a:p>
             <a:fld id="{98A996D5-9536-4841-A147-9AD88C6446A0}" type="datetimeFigureOut">
               <a:rPr lang="en-US" smtClean="0"/>
-              <a:t>11/8/18</a:t>
+              <a:t>11/16/18</a:t>
             </a:fld>
             <a:endParaRPr lang="en-US"/>
           </a:p>
@@ -3001,7 +3001,7 @@
           <a:p>
             <a:fld id="{98A996D5-9536-4841-A147-9AD88C6446A0}" type="datetimeFigureOut">
               <a:rPr lang="en-US" smtClean="0"/>
-              <a:t>11/8/18</a:t>
+              <a:t>11/16/18</a:t>
             </a:fld>
             <a:endParaRPr lang="en-US"/>
           </a:p>
@@ -3406,91 +3406,6 @@
           <a:chExt cx="0" cy="0"/>
         </a:xfrm>
       </p:grpSpPr>
-      <p:grpSp>
-        <p:nvGrpSpPr>
-          <p:cNvPr id="120" name="Group 119"/>
-          <p:cNvGrpSpPr/>
-          <p:nvPr/>
-        </p:nvGrpSpPr>
-        <p:grpSpPr>
-          <a:xfrm>
-            <a:off x="2200503" y="1592693"/>
-            <a:ext cx="454654" cy="454654"/>
-            <a:chOff x="4124448" y="1235156"/>
-            <a:chExt cx="454654" cy="454654"/>
-          </a:xfrm>
-        </p:grpSpPr>
-        <p:pic>
-          <p:nvPicPr>
-            <p:cNvPr id="121" name="Picture 120"/>
-            <p:cNvPicPr>
-              <a:picLocks noChangeAspect="1"/>
-            </p:cNvPicPr>
-            <p:nvPr/>
-          </p:nvPicPr>
-          <p:blipFill>
-            <a:blip r:embed="rId3"/>
-            <a:stretch>
-              <a:fillRect/>
-            </a:stretch>
-          </p:blipFill>
-          <p:spPr>
-            <a:xfrm>
-              <a:off x="4224775" y="1341833"/>
-              <a:ext cx="254000" cy="241300"/>
-            </a:xfrm>
-            <a:prstGeom prst="rect">
-              <a:avLst/>
-            </a:prstGeom>
-          </p:spPr>
-        </p:pic>
-        <p:sp>
-          <p:nvSpPr>
-            <p:cNvPr id="122" name="Rectangle 121"/>
-            <p:cNvSpPr/>
-            <p:nvPr/>
-          </p:nvSpPr>
-          <p:spPr>
-            <a:xfrm>
-              <a:off x="4124448" y="1235156"/>
-              <a:ext cx="454654" cy="454654"/>
-            </a:xfrm>
-            <a:prstGeom prst="rect">
-              <a:avLst/>
-            </a:prstGeom>
-            <a:noFill/>
-            <a:ln w="19050">
-              <a:solidFill>
-                <a:schemeClr val="tx1"/>
-              </a:solidFill>
-            </a:ln>
-          </p:spPr>
-          <p:style>
-            <a:lnRef idx="2">
-              <a:schemeClr val="accent1">
-                <a:shade val="50000"/>
-              </a:schemeClr>
-            </a:lnRef>
-            <a:fillRef idx="1">
-              <a:schemeClr val="accent1"/>
-            </a:fillRef>
-            <a:effectRef idx="0">
-              <a:schemeClr val="accent1"/>
-            </a:effectRef>
-            <a:fontRef idx="minor">
-              <a:schemeClr val="lt1"/>
-            </a:fontRef>
-          </p:style>
-          <p:txBody>
-            <a:bodyPr rtlCol="0" anchor="ctr"/>
-            <a:lstStyle/>
-            <a:p>
-              <a:pPr algn="ctr"/>
-              <a:endParaRPr lang="en-US"/>
-            </a:p>
-          </p:txBody>
-        </p:sp>
-      </p:grpSp>
       <p:cxnSp>
         <p:nvCxnSpPr>
           <p:cNvPr id="5" name="Straight Connector 4"/>
@@ -3507,7 +3422,7 @@
           </a:prstGeom>
           <a:ln w="19050">
             <a:solidFill>
-              <a:schemeClr val="tx1"/>
+              <a:srgbClr val="FF0000"/>
             </a:solidFill>
           </a:ln>
         </p:spPr>
@@ -3542,7 +3457,7 @@
           </a:prstGeom>
           <a:ln w="19050">
             <a:solidFill>
-              <a:schemeClr val="tx1"/>
+              <a:srgbClr val="FF0000"/>
             </a:solidFill>
           </a:ln>
         </p:spPr>
@@ -3569,15 +3484,15 @@
         </p:nvCxnSpPr>
         <p:spPr>
           <a:xfrm flipV="1">
-            <a:off x="3504379" y="1820020"/>
-            <a:ext cx="47417" cy="47418"/>
+            <a:off x="3504379" y="1820019"/>
+            <a:ext cx="54616" cy="47419"/>
           </a:xfrm>
           <a:prstGeom prst="line">
             <a:avLst/>
           </a:prstGeom>
           <a:ln w="19050">
             <a:solidFill>
-              <a:schemeClr val="tx1"/>
+              <a:srgbClr val="0070C0"/>
             </a:solidFill>
           </a:ln>
         </p:spPr>
@@ -3612,7 +3527,7 @@
           </a:prstGeom>
           <a:ln w="19050">
             <a:solidFill>
-              <a:schemeClr val="tx1"/>
+              <a:srgbClr val="00B050"/>
             </a:solidFill>
           </a:ln>
         </p:spPr>
@@ -3647,7 +3562,7 @@
           </a:prstGeom>
           <a:ln w="19050">
             <a:solidFill>
-              <a:schemeClr val="tx1"/>
+              <a:srgbClr val="00B050"/>
             </a:solidFill>
           </a:ln>
         </p:spPr>
@@ -3735,7 +3650,7 @@
             <p:nvPr/>
           </p:nvPicPr>
           <p:blipFill>
-            <a:blip r:embed="rId4"/>
+            <a:blip r:embed="rId3"/>
             <a:stretch>
               <a:fillRect/>
             </a:stretch>
@@ -3820,7 +3735,7 @@
             <p:nvPr/>
           </p:nvPicPr>
           <p:blipFill>
-            <a:blip r:embed="rId5"/>
+            <a:blip r:embed="rId4"/>
             <a:stretch>
               <a:fillRect/>
             </a:stretch>
@@ -3836,91 +3751,6 @@
           </p:spPr>
         </p:pic>
       </p:grpSp>
-      <p:grpSp>
-        <p:nvGrpSpPr>
-          <p:cNvPr id="196" name="Group 195"/>
-          <p:cNvGrpSpPr/>
-          <p:nvPr/>
-        </p:nvGrpSpPr>
-        <p:grpSpPr>
-          <a:xfrm>
-            <a:off x="4453435" y="1592693"/>
-            <a:ext cx="454654" cy="454654"/>
-            <a:chOff x="4124448" y="1235156"/>
-            <a:chExt cx="454654" cy="454654"/>
-          </a:xfrm>
-        </p:grpSpPr>
-        <p:pic>
-          <p:nvPicPr>
-            <p:cNvPr id="197" name="Picture 196"/>
-            <p:cNvPicPr>
-              <a:picLocks noChangeAspect="1"/>
-            </p:cNvPicPr>
-            <p:nvPr/>
-          </p:nvPicPr>
-          <p:blipFill>
-            <a:blip r:embed="rId3"/>
-            <a:stretch>
-              <a:fillRect/>
-            </a:stretch>
-          </p:blipFill>
-          <p:spPr>
-            <a:xfrm>
-              <a:off x="4224775" y="1341833"/>
-              <a:ext cx="254000" cy="241300"/>
-            </a:xfrm>
-            <a:prstGeom prst="rect">
-              <a:avLst/>
-            </a:prstGeom>
-          </p:spPr>
-        </p:pic>
-        <p:sp>
-          <p:nvSpPr>
-            <p:cNvPr id="198" name="Rectangle 197"/>
-            <p:cNvSpPr/>
-            <p:nvPr/>
-          </p:nvSpPr>
-          <p:spPr>
-            <a:xfrm>
-              <a:off x="4124448" y="1235156"/>
-              <a:ext cx="454654" cy="454654"/>
-            </a:xfrm>
-            <a:prstGeom prst="rect">
-              <a:avLst/>
-            </a:prstGeom>
-            <a:noFill/>
-            <a:ln w="19050">
-              <a:solidFill>
-                <a:schemeClr val="tx1"/>
-              </a:solidFill>
-            </a:ln>
-          </p:spPr>
-          <p:style>
-            <a:lnRef idx="2">
-              <a:schemeClr val="accent1">
-                <a:shade val="50000"/>
-              </a:schemeClr>
-            </a:lnRef>
-            <a:fillRef idx="1">
-              <a:schemeClr val="accent1"/>
-            </a:fillRef>
-            <a:effectRef idx="0">
-              <a:schemeClr val="accent1"/>
-            </a:effectRef>
-            <a:fontRef idx="minor">
-              <a:schemeClr val="lt1"/>
-            </a:fontRef>
-          </p:style>
-          <p:txBody>
-            <a:bodyPr rtlCol="0" anchor="ctr"/>
-            <a:lstStyle/>
-            <a:p>
-              <a:pPr algn="ctr"/>
-              <a:endParaRPr lang="en-US"/>
-            </a:p>
-          </p:txBody>
-        </p:sp>
-      </p:grpSp>
       <p:cxnSp>
         <p:nvCxnSpPr>
           <p:cNvPr id="199" name="Straight Connector 198"/>
@@ -3929,15 +3759,15 @@
         </p:nvCxnSpPr>
         <p:spPr>
           <a:xfrm>
-            <a:off x="4908089" y="1725930"/>
-            <a:ext cx="608110" cy="0"/>
+            <a:off x="4704889" y="1725930"/>
+            <a:ext cx="555357" cy="0"/>
           </a:xfrm>
           <a:prstGeom prst="line">
             <a:avLst/>
           </a:prstGeom>
           <a:ln w="19050">
             <a:solidFill>
-              <a:schemeClr val="tx1"/>
+              <a:srgbClr val="FF0000"/>
             </a:solidFill>
           </a:ln>
         </p:spPr>
@@ -3964,15 +3794,15 @@
         </p:nvCxnSpPr>
         <p:spPr>
           <a:xfrm>
-            <a:off x="4908089" y="1932708"/>
-            <a:ext cx="251758" cy="0"/>
+            <a:off x="4704889" y="1932708"/>
+            <a:ext cx="193900" cy="0"/>
           </a:xfrm>
           <a:prstGeom prst="line">
             <a:avLst/>
           </a:prstGeom>
           <a:ln w="19050">
             <a:solidFill>
-              <a:schemeClr val="tx1"/>
+              <a:srgbClr val="FF0000"/>
             </a:solidFill>
           </a:ln>
         </p:spPr>
@@ -3991,266 +3821,6 @@
           </a:fontRef>
         </p:style>
       </p:cxnSp>
-      <p:cxnSp>
-        <p:nvCxnSpPr>
-          <p:cNvPr id="201" name="Straight Connector 200"/>
-          <p:cNvCxnSpPr/>
-          <p:nvPr/>
-        </p:nvCxnSpPr>
-        <p:spPr>
-          <a:xfrm flipV="1">
-            <a:off x="5463305" y="1820019"/>
-            <a:ext cx="60343" cy="53148"/>
-          </a:xfrm>
-          <a:prstGeom prst="line">
-            <a:avLst/>
-          </a:prstGeom>
-          <a:ln w="19050">
-            <a:solidFill>
-              <a:schemeClr val="tx1"/>
-            </a:solidFill>
-          </a:ln>
-        </p:spPr>
-        <p:style>
-          <a:lnRef idx="1">
-            <a:schemeClr val="accent1"/>
-          </a:lnRef>
-          <a:fillRef idx="0">
-            <a:schemeClr val="accent1"/>
-          </a:fillRef>
-          <a:effectRef idx="0">
-            <a:schemeClr val="accent1"/>
-          </a:effectRef>
-          <a:fontRef idx="minor">
-            <a:schemeClr val="tx1"/>
-          </a:fontRef>
-        </p:style>
-      </p:cxnSp>
-      <p:grpSp>
-        <p:nvGrpSpPr>
-          <p:cNvPr id="273" name="Group 272"/>
-          <p:cNvGrpSpPr/>
-          <p:nvPr/>
-        </p:nvGrpSpPr>
-        <p:grpSpPr>
-          <a:xfrm>
-            <a:off x="5632193" y="2797926"/>
-            <a:ext cx="454654" cy="454654"/>
-            <a:chOff x="5793284" y="3237532"/>
-            <a:chExt cx="454654" cy="454654"/>
-          </a:xfrm>
-        </p:grpSpPr>
-        <p:sp>
-          <p:nvSpPr>
-            <p:cNvPr id="211" name="Rectangle 210"/>
-            <p:cNvSpPr/>
-            <p:nvPr/>
-          </p:nvSpPr>
-          <p:spPr>
-            <a:xfrm>
-              <a:off x="5793284" y="3237532"/>
-              <a:ext cx="454654" cy="454654"/>
-            </a:xfrm>
-            <a:prstGeom prst="rect">
-              <a:avLst/>
-            </a:prstGeom>
-            <a:noFill/>
-            <a:ln w="19050">
-              <a:solidFill>
-                <a:schemeClr val="tx1"/>
-              </a:solidFill>
-            </a:ln>
-          </p:spPr>
-          <p:style>
-            <a:lnRef idx="2">
-              <a:schemeClr val="accent1">
-                <a:shade val="50000"/>
-              </a:schemeClr>
-            </a:lnRef>
-            <a:fillRef idx="1">
-              <a:schemeClr val="accent1"/>
-            </a:fillRef>
-            <a:effectRef idx="0">
-              <a:schemeClr val="accent1"/>
-            </a:effectRef>
-            <a:fontRef idx="minor">
-              <a:schemeClr val="lt1"/>
-            </a:fontRef>
-          </p:style>
-          <p:txBody>
-            <a:bodyPr rtlCol="0" anchor="ctr"/>
-            <a:lstStyle/>
-            <a:p>
-              <a:pPr algn="ctr"/>
-              <a:endParaRPr lang="en-US"/>
-            </a:p>
-          </p:txBody>
-        </p:sp>
-        <p:pic>
-          <p:nvPicPr>
-            <p:cNvPr id="57" name="Picture 56"/>
-            <p:cNvPicPr>
-              <a:picLocks noChangeAspect="1"/>
-            </p:cNvPicPr>
-            <p:nvPr/>
-          </p:nvPicPr>
-          <p:blipFill>
-            <a:blip r:embed="rId6"/>
-            <a:stretch>
-              <a:fillRect/>
-            </a:stretch>
-          </p:blipFill>
-          <p:spPr>
-            <a:xfrm>
-              <a:off x="5856225" y="3314821"/>
-              <a:ext cx="317500" cy="292100"/>
-            </a:xfrm>
-            <a:prstGeom prst="rect">
-              <a:avLst/>
-            </a:prstGeom>
-          </p:spPr>
-        </p:pic>
-      </p:grpSp>
-      <p:sp>
-        <p:nvSpPr>
-          <p:cNvPr id="221" name="Rectangle 220"/>
-          <p:cNvSpPr/>
-          <p:nvPr/>
-        </p:nvSpPr>
-        <p:spPr>
-          <a:xfrm>
-            <a:off x="5157975" y="1867437"/>
-            <a:ext cx="308887" cy="308887"/>
-          </a:xfrm>
-          <a:prstGeom prst="rect">
-            <a:avLst/>
-          </a:prstGeom>
-          <a:noFill/>
-          <a:ln w="19050">
-            <a:solidFill>
-              <a:schemeClr val="tx1"/>
-            </a:solidFill>
-          </a:ln>
-        </p:spPr>
-        <p:style>
-          <a:lnRef idx="2">
-            <a:schemeClr val="accent1">
-              <a:shade val="50000"/>
-            </a:schemeClr>
-          </a:lnRef>
-          <a:fillRef idx="1">
-            <a:schemeClr val="accent1"/>
-          </a:fillRef>
-          <a:effectRef idx="0">
-            <a:schemeClr val="accent1"/>
-          </a:effectRef>
-          <a:fontRef idx="minor">
-            <a:schemeClr val="lt1"/>
-          </a:fontRef>
-        </p:style>
-        <p:txBody>
-          <a:bodyPr rtlCol="0" anchor="ctr"/>
-          <a:lstStyle/>
-          <a:p>
-            <a:pPr algn="ctr"/>
-            <a:endParaRPr lang="en-US"/>
-          </a:p>
-        </p:txBody>
-      </p:sp>
-      <p:pic>
-        <p:nvPicPr>
-          <p:cNvPr id="58" name="Picture 57"/>
-          <p:cNvPicPr>
-            <a:picLocks noChangeAspect="1"/>
-          </p:cNvPicPr>
-          <p:nvPr/>
-        </p:nvPicPr>
-        <p:blipFill>
-          <a:blip r:embed="rId7"/>
-          <a:stretch>
-            <a:fillRect/>
-          </a:stretch>
-        </p:blipFill>
-        <p:spPr>
-          <a:xfrm>
-            <a:off x="5573704" y="2299219"/>
-            <a:ext cx="207078" cy="155308"/>
-          </a:xfrm>
-          <a:prstGeom prst="rect">
-            <a:avLst/>
-          </a:prstGeom>
-        </p:spPr>
-      </p:pic>
-      <p:sp>
-        <p:nvSpPr>
-          <p:cNvPr id="224" name="Rectangle 223"/>
-          <p:cNvSpPr/>
-          <p:nvPr/>
-        </p:nvSpPr>
-        <p:spPr>
-          <a:xfrm>
-            <a:off x="5523648" y="1511132"/>
-            <a:ext cx="308887" cy="308887"/>
-          </a:xfrm>
-          <a:prstGeom prst="rect">
-            <a:avLst/>
-          </a:prstGeom>
-          <a:noFill/>
-          <a:ln w="19050">
-            <a:solidFill>
-              <a:schemeClr val="tx1"/>
-            </a:solidFill>
-          </a:ln>
-        </p:spPr>
-        <p:style>
-          <a:lnRef idx="2">
-            <a:schemeClr val="accent1">
-              <a:shade val="50000"/>
-            </a:schemeClr>
-          </a:lnRef>
-          <a:fillRef idx="1">
-            <a:schemeClr val="accent1"/>
-          </a:fillRef>
-          <a:effectRef idx="0">
-            <a:schemeClr val="accent1"/>
-          </a:effectRef>
-          <a:fontRef idx="minor">
-            <a:schemeClr val="lt1"/>
-          </a:fontRef>
-        </p:style>
-        <p:txBody>
-          <a:bodyPr rtlCol="0" anchor="ctr"/>
-          <a:lstStyle/>
-          <a:p>
-            <a:pPr algn="ctr"/>
-            <a:endParaRPr lang="en-US"/>
-          </a:p>
-        </p:txBody>
-      </p:sp>
-      <p:pic>
-        <p:nvPicPr>
-          <p:cNvPr id="236" name="Picture 235"/>
-          <p:cNvPicPr>
-            <a:picLocks noChangeAspect="1"/>
-          </p:cNvPicPr>
-          <p:nvPr/>
-        </p:nvPicPr>
-        <p:blipFill>
-          <a:blip r:embed="rId8"/>
-          <a:stretch>
-            <a:fillRect/>
-          </a:stretch>
-        </p:blipFill>
-        <p:spPr>
-          <a:xfrm>
-            <a:off x="5926434" y="1935000"/>
-            <a:ext cx="232963" cy="181193"/>
-          </a:xfrm>
-          <a:prstGeom prst="rect">
-            <a:avLst/>
-          </a:prstGeom>
-        </p:spPr>
-      </p:pic>
       <p:grpSp>
         <p:nvGrpSpPr>
           <p:cNvPr id="244" name="Group 243"/>
@@ -4320,7 +3890,7 @@
             <p:nvPr/>
           </p:nvPicPr>
           <p:blipFill>
-            <a:blip r:embed="rId9"/>
+            <a:blip r:embed="rId5"/>
             <a:stretch>
               <a:fillRect/>
             </a:stretch>
@@ -4336,51 +3906,891 @@
           </p:spPr>
         </p:pic>
       </p:grpSp>
-      <p:cxnSp>
-        <p:nvCxnSpPr>
-          <p:cNvPr id="219" name="Straight Connector 218"/>
-          <p:cNvCxnSpPr/>
+      <p:grpSp>
+        <p:nvGrpSpPr>
+          <p:cNvPr id="196" name="Group 195"/>
+          <p:cNvGrpSpPr/>
           <p:nvPr/>
-        </p:nvCxnSpPr>
-        <p:spPr>
-          <a:xfrm flipV="1">
-            <a:off x="5834222" y="2174589"/>
-            <a:ext cx="50597" cy="50598"/>
+        </p:nvGrpSpPr>
+        <p:grpSpPr>
+          <a:xfrm>
+            <a:off x="4250235" y="1592693"/>
+            <a:ext cx="454654" cy="454654"/>
+            <a:chOff x="4124448" y="1235156"/>
+            <a:chExt cx="454654" cy="454654"/>
           </a:xfrm>
-          <a:prstGeom prst="line">
-            <a:avLst/>
-          </a:prstGeom>
-          <a:ln w="19050">
-            <a:solidFill>
-              <a:schemeClr val="tx1"/>
-            </a:solidFill>
-          </a:ln>
-        </p:spPr>
-        <p:style>
-          <a:lnRef idx="1">
-            <a:schemeClr val="accent1"/>
-          </a:lnRef>
-          <a:fillRef idx="0">
-            <a:schemeClr val="accent1"/>
-          </a:fillRef>
-          <a:effectRef idx="0">
-            <a:schemeClr val="accent1"/>
-          </a:effectRef>
-          <a:fontRef idx="minor">
-            <a:schemeClr val="tx1"/>
-          </a:fontRef>
-        </p:style>
-      </p:cxnSp>
-      <p:sp>
-        <p:nvSpPr>
-          <p:cNvPr id="253" name="Rectangle 252"/>
+        </p:grpSpPr>
+        <p:pic>
+          <p:nvPicPr>
+            <p:cNvPr id="197" name="Picture 196"/>
+            <p:cNvPicPr>
+              <a:picLocks noChangeAspect="1"/>
+            </p:cNvPicPr>
+            <p:nvPr/>
+          </p:nvPicPr>
+          <p:blipFill>
+            <a:blip r:embed="rId6"/>
+            <a:stretch>
+              <a:fillRect/>
+            </a:stretch>
+          </p:blipFill>
+          <p:spPr>
+            <a:xfrm>
+              <a:off x="4224775" y="1341833"/>
+              <a:ext cx="254000" cy="241300"/>
+            </a:xfrm>
+            <a:prstGeom prst="rect">
+              <a:avLst/>
+            </a:prstGeom>
+          </p:spPr>
+        </p:pic>
+        <p:sp>
+          <p:nvSpPr>
+            <p:cNvPr id="198" name="Rectangle 197"/>
+            <p:cNvSpPr/>
+            <p:nvPr/>
+          </p:nvSpPr>
+          <p:spPr>
+            <a:xfrm>
+              <a:off x="4124448" y="1235156"/>
+              <a:ext cx="454654" cy="454654"/>
+            </a:xfrm>
+            <a:prstGeom prst="rect">
+              <a:avLst/>
+            </a:prstGeom>
+            <a:noFill/>
+            <a:ln w="19050">
+              <a:solidFill>
+                <a:schemeClr val="tx1"/>
+              </a:solidFill>
+            </a:ln>
+          </p:spPr>
+          <p:style>
+            <a:lnRef idx="2">
+              <a:schemeClr val="accent1">
+                <a:shade val="50000"/>
+              </a:schemeClr>
+            </a:lnRef>
+            <a:fillRef idx="1">
+              <a:schemeClr val="accent1"/>
+            </a:fillRef>
+            <a:effectRef idx="0">
+              <a:schemeClr val="accent1"/>
+            </a:effectRef>
+            <a:fontRef idx="minor">
+              <a:schemeClr val="lt1"/>
+            </a:fontRef>
+          </p:style>
+          <p:txBody>
+            <a:bodyPr rtlCol="0" anchor="ctr"/>
+            <a:lstStyle/>
+            <a:p>
+              <a:pPr algn="ctr"/>
+              <a:endParaRPr lang="en-US"/>
+            </a:p>
+          </p:txBody>
+        </p:sp>
+      </p:grpSp>
+      <p:grpSp>
+        <p:nvGrpSpPr>
+          <p:cNvPr id="120" name="Group 119"/>
+          <p:cNvGrpSpPr/>
+          <p:nvPr/>
+        </p:nvGrpSpPr>
+        <p:grpSpPr>
+          <a:xfrm>
+            <a:off x="2200503" y="1592693"/>
+            <a:ext cx="454654" cy="454654"/>
+            <a:chOff x="4124448" y="1235156"/>
+            <a:chExt cx="454654" cy="454654"/>
+          </a:xfrm>
+        </p:grpSpPr>
+        <p:pic>
+          <p:nvPicPr>
+            <p:cNvPr id="121" name="Picture 120"/>
+            <p:cNvPicPr>
+              <a:picLocks noChangeAspect="1"/>
+            </p:cNvPicPr>
+            <p:nvPr/>
+          </p:nvPicPr>
+          <p:blipFill>
+            <a:blip r:embed="rId6"/>
+            <a:stretch>
+              <a:fillRect/>
+            </a:stretch>
+          </p:blipFill>
+          <p:spPr>
+            <a:xfrm>
+              <a:off x="4224775" y="1341833"/>
+              <a:ext cx="254000" cy="241300"/>
+            </a:xfrm>
+            <a:prstGeom prst="rect">
+              <a:avLst/>
+            </a:prstGeom>
+          </p:spPr>
+        </p:pic>
+        <p:sp>
+          <p:nvSpPr>
+            <p:cNvPr id="122" name="Rectangle 121"/>
+            <p:cNvSpPr/>
+            <p:nvPr/>
+          </p:nvSpPr>
+          <p:spPr>
+            <a:xfrm>
+              <a:off x="4124448" y="1235156"/>
+              <a:ext cx="454654" cy="454654"/>
+            </a:xfrm>
+            <a:prstGeom prst="rect">
+              <a:avLst/>
+            </a:prstGeom>
+            <a:noFill/>
+            <a:ln w="19050">
+              <a:solidFill>
+                <a:schemeClr val="tx1"/>
+              </a:solidFill>
+            </a:ln>
+          </p:spPr>
+          <p:style>
+            <a:lnRef idx="2">
+              <a:schemeClr val="accent1">
+                <a:shade val="50000"/>
+              </a:schemeClr>
+            </a:lnRef>
+            <a:fillRef idx="1">
+              <a:schemeClr val="accent1"/>
+            </a:fillRef>
+            <a:effectRef idx="0">
+              <a:schemeClr val="accent1"/>
+            </a:effectRef>
+            <a:fontRef idx="minor">
+              <a:schemeClr val="lt1"/>
+            </a:fontRef>
+          </p:style>
+          <p:txBody>
+            <a:bodyPr rtlCol="0" anchor="ctr"/>
+            <a:lstStyle/>
+            <a:p>
+              <a:pPr algn="ctr"/>
+              <a:endParaRPr lang="en-US"/>
+            </a:p>
+          </p:txBody>
+        </p:sp>
+      </p:grpSp>
+      <p:grpSp>
+        <p:nvGrpSpPr>
+          <p:cNvPr id="8" name="Group 7"/>
+          <p:cNvGrpSpPr/>
+          <p:nvPr/>
+        </p:nvGrpSpPr>
+        <p:grpSpPr>
+          <a:xfrm>
+            <a:off x="4898789" y="1511132"/>
+            <a:ext cx="1039385" cy="1650776"/>
+            <a:chOff x="4954775" y="1511132"/>
+            <a:chExt cx="1039385" cy="1650776"/>
+          </a:xfrm>
+        </p:grpSpPr>
+        <p:pic>
+          <p:nvPicPr>
+            <p:cNvPr id="254" name="Picture 253"/>
+            <p:cNvPicPr>
+              <a:picLocks noChangeAspect="1"/>
+            </p:cNvPicPr>
+            <p:nvPr/>
+          </p:nvPicPr>
+          <p:blipFill>
+            <a:blip r:embed="rId3"/>
+            <a:stretch>
+              <a:fillRect/>
+            </a:stretch>
+          </p:blipFill>
+          <p:spPr>
+            <a:xfrm>
+              <a:off x="5005679" y="1952854"/>
+              <a:ext cx="207078" cy="138052"/>
+            </a:xfrm>
+            <a:prstGeom prst="rect">
+              <a:avLst/>
+            </a:prstGeom>
+          </p:spPr>
+        </p:pic>
+        <p:grpSp>
+          <p:nvGrpSpPr>
+            <p:cNvPr id="7" name="Group 6"/>
+            <p:cNvGrpSpPr/>
+            <p:nvPr/>
+          </p:nvGrpSpPr>
+          <p:grpSpPr>
+            <a:xfrm>
+              <a:off x="4954775" y="1511132"/>
+              <a:ext cx="1039385" cy="1650776"/>
+              <a:chOff x="4954775" y="1511132"/>
+              <a:chExt cx="1039385" cy="1650776"/>
+            </a:xfrm>
+          </p:grpSpPr>
+          <p:cxnSp>
+            <p:nvCxnSpPr>
+              <p:cNvPr id="201" name="Straight Connector 200"/>
+              <p:cNvCxnSpPr/>
+              <p:nvPr/>
+            </p:nvCxnSpPr>
+            <p:spPr>
+              <a:xfrm flipV="1">
+                <a:off x="5260105" y="1820019"/>
+                <a:ext cx="60343" cy="53148"/>
+              </a:xfrm>
+              <a:prstGeom prst="line">
+                <a:avLst/>
+              </a:prstGeom>
+              <a:ln w="19050">
+                <a:solidFill>
+                  <a:srgbClr val="0070C0"/>
+                </a:solidFill>
+              </a:ln>
+            </p:spPr>
+            <p:style>
+              <a:lnRef idx="1">
+                <a:schemeClr val="accent1"/>
+              </a:lnRef>
+              <a:fillRef idx="0">
+                <a:schemeClr val="accent1"/>
+              </a:fillRef>
+              <a:effectRef idx="0">
+                <a:schemeClr val="accent1"/>
+              </a:effectRef>
+              <a:fontRef idx="minor">
+                <a:schemeClr val="tx1"/>
+              </a:fontRef>
+            </p:style>
+          </p:cxnSp>
+          <p:pic>
+            <p:nvPicPr>
+              <p:cNvPr id="58" name="Picture 57"/>
+              <p:cNvPicPr>
+                <a:picLocks noChangeAspect="1"/>
+              </p:cNvPicPr>
+              <p:nvPr/>
+            </p:nvPicPr>
+            <p:blipFill>
+              <a:blip r:embed="rId7"/>
+              <a:stretch>
+                <a:fillRect/>
+              </a:stretch>
+            </p:blipFill>
+            <p:spPr>
+              <a:xfrm>
+                <a:off x="5370504" y="2299219"/>
+                <a:ext cx="207078" cy="155308"/>
+              </a:xfrm>
+              <a:prstGeom prst="rect">
+                <a:avLst/>
+              </a:prstGeom>
+            </p:spPr>
+          </p:pic>
+          <p:pic>
+            <p:nvPicPr>
+              <p:cNvPr id="236" name="Picture 235"/>
+              <p:cNvPicPr>
+                <a:picLocks noChangeAspect="1"/>
+              </p:cNvPicPr>
+              <p:nvPr/>
+            </p:nvPicPr>
+            <p:blipFill>
+              <a:blip r:embed="rId8"/>
+              <a:stretch>
+                <a:fillRect/>
+              </a:stretch>
+            </p:blipFill>
+            <p:spPr>
+              <a:xfrm>
+                <a:off x="5723234" y="1935000"/>
+                <a:ext cx="232963" cy="181193"/>
+              </a:xfrm>
+              <a:prstGeom prst="rect">
+                <a:avLst/>
+              </a:prstGeom>
+            </p:spPr>
+          </p:pic>
+          <p:cxnSp>
+            <p:nvCxnSpPr>
+              <p:cNvPr id="219" name="Straight Connector 218"/>
+              <p:cNvCxnSpPr/>
+              <p:nvPr/>
+            </p:nvCxnSpPr>
+            <p:spPr>
+              <a:xfrm flipV="1">
+                <a:off x="5631022" y="2174589"/>
+                <a:ext cx="50597" cy="50598"/>
+              </a:xfrm>
+              <a:prstGeom prst="line">
+                <a:avLst/>
+              </a:prstGeom>
+              <a:ln w="19050">
+                <a:solidFill>
+                  <a:srgbClr val="0070C0"/>
+                </a:solidFill>
+              </a:ln>
+            </p:spPr>
+            <p:style>
+              <a:lnRef idx="1">
+                <a:schemeClr val="accent1"/>
+              </a:lnRef>
+              <a:fillRef idx="0">
+                <a:schemeClr val="accent1"/>
+              </a:fillRef>
+              <a:effectRef idx="0">
+                <a:schemeClr val="accent1"/>
+              </a:effectRef>
+              <a:fontRef idx="minor">
+                <a:schemeClr val="tx1"/>
+              </a:fontRef>
+            </p:style>
+          </p:cxnSp>
+          <p:pic>
+            <p:nvPicPr>
+              <p:cNvPr id="257" name="Picture 256"/>
+              <p:cNvPicPr>
+                <a:picLocks noChangeAspect="1"/>
+              </p:cNvPicPr>
+              <p:nvPr/>
+            </p:nvPicPr>
+            <p:blipFill>
+              <a:blip r:embed="rId5"/>
+              <a:stretch>
+                <a:fillRect/>
+              </a:stretch>
+            </p:blipFill>
+            <p:spPr>
+              <a:xfrm>
+                <a:off x="5358409" y="1582706"/>
+                <a:ext cx="232963" cy="172565"/>
+              </a:xfrm>
+              <a:prstGeom prst="rect">
+                <a:avLst/>
+              </a:prstGeom>
+            </p:spPr>
+          </p:pic>
+          <p:grpSp>
+            <p:nvGrpSpPr>
+              <p:cNvPr id="266" name="Group 265"/>
+              <p:cNvGrpSpPr/>
+              <p:nvPr/>
+            </p:nvGrpSpPr>
+            <p:grpSpPr>
+              <a:xfrm>
+                <a:off x="5214632" y="2174679"/>
+                <a:ext cx="101600" cy="101600"/>
+                <a:chOff x="5472583" y="2174679"/>
+                <a:chExt cx="101600" cy="101600"/>
+              </a:xfrm>
+            </p:grpSpPr>
+            <p:cxnSp>
+              <p:nvCxnSpPr>
+                <p:cNvPr id="228" name="Straight Connector 227"/>
+                <p:cNvCxnSpPr/>
+                <p:nvPr/>
+              </p:nvCxnSpPr>
+              <p:spPr>
+                <a:xfrm>
+                  <a:off x="5478589" y="2174679"/>
+                  <a:ext cx="0" cy="101600"/>
+                </a:xfrm>
+                <a:prstGeom prst="line">
+                  <a:avLst/>
+                </a:prstGeom>
+                <a:ln w="19050">
+                  <a:solidFill>
+                    <a:srgbClr val="FFC000"/>
+                  </a:solidFill>
+                </a:ln>
+              </p:spPr>
+              <p:style>
+                <a:lnRef idx="1">
+                  <a:schemeClr val="accent1"/>
+                </a:lnRef>
+                <a:fillRef idx="0">
+                  <a:schemeClr val="accent1"/>
+                </a:fillRef>
+                <a:effectRef idx="0">
+                  <a:schemeClr val="accent1"/>
+                </a:effectRef>
+                <a:fontRef idx="minor">
+                  <a:schemeClr val="tx1"/>
+                </a:fontRef>
+              </p:style>
+            </p:cxnSp>
+            <p:cxnSp>
+              <p:nvCxnSpPr>
+                <p:cNvPr id="265" name="Straight Connector 264"/>
+                <p:cNvCxnSpPr/>
+                <p:nvPr/>
+              </p:nvCxnSpPr>
+              <p:spPr>
+                <a:xfrm rot="16200000">
+                  <a:off x="5523383" y="2219035"/>
+                  <a:ext cx="0" cy="101600"/>
+                </a:xfrm>
+                <a:prstGeom prst="line">
+                  <a:avLst/>
+                </a:prstGeom>
+                <a:ln w="19050">
+                  <a:solidFill>
+                    <a:srgbClr val="FFC000"/>
+                  </a:solidFill>
+                </a:ln>
+              </p:spPr>
+              <p:style>
+                <a:lnRef idx="1">
+                  <a:schemeClr val="accent1"/>
+                </a:lnRef>
+                <a:fillRef idx="0">
+                  <a:schemeClr val="accent1"/>
+                </a:fillRef>
+                <a:effectRef idx="0">
+                  <a:schemeClr val="accent1"/>
+                </a:effectRef>
+                <a:fontRef idx="minor">
+                  <a:schemeClr val="tx1"/>
+                </a:fontRef>
+              </p:style>
+            </p:cxnSp>
+          </p:grpSp>
+          <p:grpSp>
+            <p:nvGrpSpPr>
+              <p:cNvPr id="267" name="Group 266"/>
+              <p:cNvGrpSpPr/>
+              <p:nvPr/>
+            </p:nvGrpSpPr>
+            <p:grpSpPr>
+              <a:xfrm>
+                <a:off x="5577582" y="1830270"/>
+                <a:ext cx="101600" cy="101600"/>
+                <a:chOff x="5472583" y="2174679"/>
+                <a:chExt cx="101600" cy="101600"/>
+              </a:xfrm>
+            </p:grpSpPr>
+            <p:cxnSp>
+              <p:nvCxnSpPr>
+                <p:cNvPr id="268" name="Straight Connector 267"/>
+                <p:cNvCxnSpPr/>
+                <p:nvPr/>
+              </p:nvCxnSpPr>
+              <p:spPr>
+                <a:xfrm>
+                  <a:off x="5478589" y="2174679"/>
+                  <a:ext cx="0" cy="101600"/>
+                </a:xfrm>
+                <a:prstGeom prst="line">
+                  <a:avLst/>
+                </a:prstGeom>
+                <a:ln w="19050">
+                  <a:solidFill>
+                    <a:srgbClr val="FFC000"/>
+                  </a:solidFill>
+                </a:ln>
+              </p:spPr>
+              <p:style>
+                <a:lnRef idx="1">
+                  <a:schemeClr val="accent1"/>
+                </a:lnRef>
+                <a:fillRef idx="0">
+                  <a:schemeClr val="accent1"/>
+                </a:fillRef>
+                <a:effectRef idx="0">
+                  <a:schemeClr val="accent1"/>
+                </a:effectRef>
+                <a:fontRef idx="minor">
+                  <a:schemeClr val="tx1"/>
+                </a:fontRef>
+              </p:style>
+            </p:cxnSp>
+            <p:cxnSp>
+              <p:nvCxnSpPr>
+                <p:cNvPr id="269" name="Straight Connector 268"/>
+                <p:cNvCxnSpPr/>
+                <p:nvPr/>
+              </p:nvCxnSpPr>
+              <p:spPr>
+                <a:xfrm rot="16200000">
+                  <a:off x="5523383" y="2219035"/>
+                  <a:ext cx="0" cy="101600"/>
+                </a:xfrm>
+                <a:prstGeom prst="line">
+                  <a:avLst/>
+                </a:prstGeom>
+                <a:ln w="19050">
+                  <a:solidFill>
+                    <a:srgbClr val="FFC000"/>
+                  </a:solidFill>
+                </a:ln>
+              </p:spPr>
+              <p:style>
+                <a:lnRef idx="1">
+                  <a:schemeClr val="accent1"/>
+                </a:lnRef>
+                <a:fillRef idx="0">
+                  <a:schemeClr val="accent1"/>
+                </a:fillRef>
+                <a:effectRef idx="0">
+                  <a:schemeClr val="accent1"/>
+                </a:effectRef>
+                <a:fontRef idx="minor">
+                  <a:schemeClr val="tx1"/>
+                </a:fontRef>
+              </p:style>
+            </p:cxnSp>
+          </p:grpSp>
+          <p:cxnSp>
+            <p:nvCxnSpPr>
+              <p:cNvPr id="271" name="Straight Connector 270"/>
+              <p:cNvCxnSpPr/>
+              <p:nvPr/>
+            </p:nvCxnSpPr>
+            <p:spPr>
+              <a:xfrm>
+                <a:off x="5577582" y="2539727"/>
+                <a:ext cx="0" cy="172934"/>
+              </a:xfrm>
+              <a:prstGeom prst="line">
+                <a:avLst/>
+              </a:prstGeom>
+              <a:ln w="19050">
+                <a:solidFill>
+                  <a:srgbClr val="00B050"/>
+                </a:solidFill>
+              </a:ln>
+            </p:spPr>
+            <p:style>
+              <a:lnRef idx="1">
+                <a:schemeClr val="accent1"/>
+              </a:lnRef>
+              <a:fillRef idx="0">
+                <a:schemeClr val="accent1"/>
+              </a:fillRef>
+              <a:effectRef idx="0">
+                <a:schemeClr val="accent1"/>
+              </a:effectRef>
+              <a:fontRef idx="minor">
+                <a:schemeClr val="tx1"/>
+              </a:fontRef>
+            </p:style>
+          </p:cxnSp>
+          <p:cxnSp>
+            <p:nvCxnSpPr>
+              <p:cNvPr id="272" name="Straight Connector 271"/>
+              <p:cNvCxnSpPr/>
+              <p:nvPr/>
+            </p:nvCxnSpPr>
+            <p:spPr>
+              <a:xfrm>
+                <a:off x="5734164" y="2183375"/>
+                <a:ext cx="0" cy="520891"/>
+              </a:xfrm>
+              <a:prstGeom prst="line">
+                <a:avLst/>
+              </a:prstGeom>
+              <a:ln w="19050">
+                <a:solidFill>
+                  <a:srgbClr val="00B050"/>
+                </a:solidFill>
+              </a:ln>
+            </p:spPr>
+            <p:style>
+              <a:lnRef idx="1">
+                <a:schemeClr val="accent1"/>
+              </a:lnRef>
+              <a:fillRef idx="0">
+                <a:schemeClr val="accent1"/>
+              </a:fillRef>
+              <a:effectRef idx="0">
+                <a:schemeClr val="accent1"/>
+              </a:effectRef>
+              <a:fontRef idx="minor">
+                <a:schemeClr val="tx1"/>
+              </a:fontRef>
+            </p:style>
+          </p:cxnSp>
+          <p:sp>
+            <p:nvSpPr>
+              <p:cNvPr id="221" name="Rectangle 220"/>
+              <p:cNvSpPr/>
+              <p:nvPr/>
+            </p:nvSpPr>
+            <p:spPr>
+              <a:xfrm>
+                <a:off x="4954775" y="1867437"/>
+                <a:ext cx="308887" cy="308887"/>
+              </a:xfrm>
+              <a:prstGeom prst="rect">
+                <a:avLst/>
+              </a:prstGeom>
+              <a:noFill/>
+              <a:ln w="19050">
+                <a:solidFill>
+                  <a:schemeClr val="tx1"/>
+                </a:solidFill>
+              </a:ln>
+            </p:spPr>
+            <p:style>
+              <a:lnRef idx="2">
+                <a:schemeClr val="accent1">
+                  <a:shade val="50000"/>
+                </a:schemeClr>
+              </a:lnRef>
+              <a:fillRef idx="1">
+                <a:schemeClr val="accent1"/>
+              </a:fillRef>
+              <a:effectRef idx="0">
+                <a:schemeClr val="accent1"/>
+              </a:effectRef>
+              <a:fontRef idx="minor">
+                <a:schemeClr val="lt1"/>
+              </a:fontRef>
+            </p:style>
+            <p:txBody>
+              <a:bodyPr rtlCol="0" anchor="ctr"/>
+              <a:lstStyle/>
+              <a:p>
+                <a:pPr algn="ctr"/>
+                <a:endParaRPr lang="en-US"/>
+              </a:p>
+            </p:txBody>
+          </p:sp>
+          <p:sp>
+            <p:nvSpPr>
+              <p:cNvPr id="253" name="Rectangle 252"/>
+              <p:cNvSpPr/>
+              <p:nvPr/>
+            </p:nvSpPr>
+            <p:spPr>
+              <a:xfrm>
+                <a:off x="5320448" y="2224399"/>
+                <a:ext cx="308887" cy="308887"/>
+              </a:xfrm>
+              <a:prstGeom prst="rect">
+                <a:avLst/>
+              </a:prstGeom>
+              <a:noFill/>
+              <a:ln w="19050">
+                <a:solidFill>
+                  <a:schemeClr val="tx1"/>
+                </a:solidFill>
+              </a:ln>
+            </p:spPr>
+            <p:style>
+              <a:lnRef idx="2">
+                <a:schemeClr val="accent1">
+                  <a:shade val="50000"/>
+                </a:schemeClr>
+              </a:lnRef>
+              <a:fillRef idx="1">
+                <a:schemeClr val="accent1"/>
+              </a:fillRef>
+              <a:effectRef idx="0">
+                <a:schemeClr val="accent1"/>
+              </a:effectRef>
+              <a:fontRef idx="minor">
+                <a:schemeClr val="lt1"/>
+              </a:fontRef>
+            </p:style>
+            <p:txBody>
+              <a:bodyPr rtlCol="0" anchor="ctr"/>
+              <a:lstStyle/>
+              <a:p>
+                <a:pPr algn="ctr"/>
+                <a:endParaRPr lang="en-US"/>
+              </a:p>
+            </p:txBody>
+          </p:sp>
+          <p:sp>
+            <p:nvSpPr>
+              <p:cNvPr id="256" name="Rectangle 255"/>
+              <p:cNvSpPr/>
+              <p:nvPr/>
+            </p:nvSpPr>
+            <p:spPr>
+              <a:xfrm>
+                <a:off x="5685273" y="1867437"/>
+                <a:ext cx="308887" cy="308887"/>
+              </a:xfrm>
+              <a:prstGeom prst="rect">
+                <a:avLst/>
+              </a:prstGeom>
+              <a:noFill/>
+              <a:ln w="19050">
+                <a:solidFill>
+                  <a:schemeClr val="tx1"/>
+                </a:solidFill>
+              </a:ln>
+            </p:spPr>
+            <p:style>
+              <a:lnRef idx="2">
+                <a:schemeClr val="accent1">
+                  <a:shade val="50000"/>
+                </a:schemeClr>
+              </a:lnRef>
+              <a:fillRef idx="1">
+                <a:schemeClr val="accent1"/>
+              </a:fillRef>
+              <a:effectRef idx="0">
+                <a:schemeClr val="accent1"/>
+              </a:effectRef>
+              <a:fontRef idx="minor">
+                <a:schemeClr val="lt1"/>
+              </a:fontRef>
+            </p:style>
+            <p:txBody>
+              <a:bodyPr rtlCol="0" anchor="ctr"/>
+              <a:lstStyle/>
+              <a:p>
+                <a:pPr algn="ctr"/>
+                <a:endParaRPr lang="en-US"/>
+              </a:p>
+            </p:txBody>
+          </p:sp>
+          <p:grpSp>
+            <p:nvGrpSpPr>
+              <p:cNvPr id="273" name="Group 272"/>
+              <p:cNvGrpSpPr/>
+              <p:nvPr/>
+            </p:nvGrpSpPr>
+            <p:grpSpPr>
+              <a:xfrm>
+                <a:off x="5428993" y="2707254"/>
+                <a:ext cx="454654" cy="454654"/>
+                <a:chOff x="5793284" y="3237532"/>
+                <a:chExt cx="454654" cy="454654"/>
+              </a:xfrm>
+            </p:grpSpPr>
+            <p:sp>
+              <p:nvSpPr>
+                <p:cNvPr id="211" name="Rectangle 210"/>
+                <p:cNvSpPr/>
+                <p:nvPr/>
+              </p:nvSpPr>
+              <p:spPr>
+                <a:xfrm>
+                  <a:off x="5793284" y="3237532"/>
+                  <a:ext cx="454654" cy="454654"/>
+                </a:xfrm>
+                <a:prstGeom prst="rect">
+                  <a:avLst/>
+                </a:prstGeom>
+                <a:noFill/>
+                <a:ln w="19050">
+                  <a:solidFill>
+                    <a:schemeClr val="tx1"/>
+                  </a:solidFill>
+                </a:ln>
+              </p:spPr>
+              <p:style>
+                <a:lnRef idx="2">
+                  <a:schemeClr val="accent1">
+                    <a:shade val="50000"/>
+                  </a:schemeClr>
+                </a:lnRef>
+                <a:fillRef idx="1">
+                  <a:schemeClr val="accent1"/>
+                </a:fillRef>
+                <a:effectRef idx="0">
+                  <a:schemeClr val="accent1"/>
+                </a:effectRef>
+                <a:fontRef idx="minor">
+                  <a:schemeClr val="lt1"/>
+                </a:fontRef>
+              </p:style>
+              <p:txBody>
+                <a:bodyPr rtlCol="0" anchor="ctr"/>
+                <a:lstStyle/>
+                <a:p>
+                  <a:pPr algn="ctr"/>
+                  <a:endParaRPr lang="en-US"/>
+                </a:p>
+              </p:txBody>
+            </p:sp>
+            <p:pic>
+              <p:nvPicPr>
+                <p:cNvPr id="57" name="Picture 56"/>
+                <p:cNvPicPr>
+                  <a:picLocks noChangeAspect="1"/>
+                </p:cNvPicPr>
+                <p:nvPr/>
+              </p:nvPicPr>
+              <p:blipFill>
+                <a:blip r:embed="rId9"/>
+                <a:stretch>
+                  <a:fillRect/>
+                </a:stretch>
+              </p:blipFill>
+              <p:spPr>
+                <a:xfrm>
+                  <a:off x="5856225" y="3314821"/>
+                  <a:ext cx="317500" cy="292100"/>
+                </a:xfrm>
+                <a:prstGeom prst="rect">
+                  <a:avLst/>
+                </a:prstGeom>
+              </p:spPr>
+            </p:pic>
+          </p:grpSp>
+          <p:sp>
+            <p:nvSpPr>
+              <p:cNvPr id="224" name="Rectangle 223"/>
+              <p:cNvSpPr/>
+              <p:nvPr/>
+            </p:nvSpPr>
+            <p:spPr>
+              <a:xfrm>
+                <a:off x="5320448" y="1511132"/>
+                <a:ext cx="308887" cy="308887"/>
+              </a:xfrm>
+              <a:prstGeom prst="rect">
+                <a:avLst/>
+              </a:prstGeom>
+              <a:noFill/>
+              <a:ln w="19050">
+                <a:solidFill>
+                  <a:schemeClr val="tx1"/>
+                </a:solidFill>
+              </a:ln>
+            </p:spPr>
+            <p:style>
+              <a:lnRef idx="2">
+                <a:schemeClr val="accent1">
+                  <a:shade val="50000"/>
+                </a:schemeClr>
+              </a:lnRef>
+              <a:fillRef idx="1">
+                <a:schemeClr val="accent1"/>
+              </a:fillRef>
+              <a:effectRef idx="0">
+                <a:schemeClr val="accent1"/>
+              </a:effectRef>
+              <a:fontRef idx="minor">
+                <a:schemeClr val="lt1"/>
+              </a:fontRef>
+            </p:style>
+            <p:txBody>
+              <a:bodyPr rtlCol="0" anchor="ctr"/>
+              <a:lstStyle/>
+              <a:p>
+                <a:pPr algn="ctr"/>
+                <a:endParaRPr lang="en-US"/>
+              </a:p>
+            </p:txBody>
+          </p:sp>
+        </p:grpSp>
+      </p:grpSp>
+      <p:sp>
+        <p:nvSpPr>
+          <p:cNvPr id="46" name="Rectangle 45"/>
           <p:cNvSpPr/>
           <p:nvPr/>
         </p:nvSpPr>
         <p:spPr>
           <a:xfrm>
-            <a:off x="5523648" y="2224399"/>
-            <a:ext cx="308887" cy="308887"/>
+            <a:off x="2200503" y="2704839"/>
+            <a:ext cx="454654" cy="454654"/>
           </a:xfrm>
           <a:prstGeom prst="rect">
             <a:avLst/>
@@ -4417,24 +4827,94 @@
           </a:p>
         </p:txBody>
       </p:sp>
+      <p:cxnSp>
+        <p:nvCxnSpPr>
+          <p:cNvPr id="47" name="Straight Connector 46"/>
+          <p:cNvCxnSpPr/>
+          <p:nvPr/>
+        </p:nvCxnSpPr>
+        <p:spPr>
+          <a:xfrm>
+            <a:off x="2655157" y="2932166"/>
+            <a:ext cx="666396" cy="0"/>
+          </a:xfrm>
+          <a:prstGeom prst="line">
+            <a:avLst/>
+          </a:prstGeom>
+          <a:ln w="19050">
+            <a:solidFill>
+              <a:schemeClr val="tx1"/>
+            </a:solidFill>
+          </a:ln>
+        </p:spPr>
+        <p:style>
+          <a:lnRef idx="1">
+            <a:schemeClr val="accent1"/>
+          </a:lnRef>
+          <a:fillRef idx="0">
+            <a:schemeClr val="accent1"/>
+          </a:fillRef>
+          <a:effectRef idx="0">
+            <a:schemeClr val="accent1"/>
+          </a:effectRef>
+          <a:fontRef idx="minor">
+            <a:schemeClr val="tx1"/>
+          </a:fontRef>
+        </p:style>
+      </p:cxnSp>
+      <p:cxnSp>
+        <p:nvCxnSpPr>
+          <p:cNvPr id="48" name="Straight Connector 47"/>
+          <p:cNvCxnSpPr/>
+          <p:nvPr/>
+        </p:nvCxnSpPr>
+        <p:spPr>
+          <a:xfrm flipV="1">
+            <a:off x="2427830" y="2047347"/>
+            <a:ext cx="0" cy="657492"/>
+          </a:xfrm>
+          <a:prstGeom prst="line">
+            <a:avLst/>
+          </a:prstGeom>
+          <a:ln w="19050">
+            <a:solidFill>
+              <a:schemeClr val="tx1"/>
+            </a:solidFill>
+          </a:ln>
+        </p:spPr>
+        <p:style>
+          <a:lnRef idx="1">
+            <a:schemeClr val="accent1"/>
+          </a:lnRef>
+          <a:fillRef idx="0">
+            <a:schemeClr val="accent1"/>
+          </a:fillRef>
+          <a:effectRef idx="0">
+            <a:schemeClr val="accent1"/>
+          </a:effectRef>
+          <a:fontRef idx="minor">
+            <a:schemeClr val="tx1"/>
+          </a:fontRef>
+        </p:style>
+      </p:cxnSp>
       <p:pic>
         <p:nvPicPr>
-          <p:cNvPr id="254" name="Picture 253"/>
+          <p:cNvPr id="49" name="Picture 48"/>
           <p:cNvPicPr>
             <a:picLocks noChangeAspect="1"/>
           </p:cNvPicPr>
           <p:nvPr/>
         </p:nvPicPr>
         <p:blipFill>
-          <a:blip r:embed="rId4"/>
+          <a:blip r:embed="rId10"/>
           <a:stretch>
             <a:fillRect/>
           </a:stretch>
         </p:blipFill>
         <p:spPr>
           <a:xfrm>
-            <a:off x="5208879" y="1952854"/>
-            <a:ext cx="207078" cy="138052"/>
+            <a:off x="2288130" y="2811628"/>
+            <a:ext cx="279400" cy="228600"/>
           </a:xfrm>
           <a:prstGeom prst="rect">
             <a:avLst/>
@@ -4443,14 +4923,14 @@
       </p:pic>
       <p:sp>
         <p:nvSpPr>
-          <p:cNvPr id="256" name="Rectangle 255"/>
+          <p:cNvPr id="50" name="Rectangle 49"/>
           <p:cNvSpPr/>
           <p:nvPr/>
         </p:nvSpPr>
         <p:spPr>
           <a:xfrm>
-            <a:off x="5888473" y="1867437"/>
-            <a:ext cx="308887" cy="308887"/>
+            <a:off x="4242998" y="2712661"/>
+            <a:ext cx="454654" cy="454654"/>
           </a:xfrm>
           <a:prstGeom prst="rect">
             <a:avLst/>
@@ -4487,210 +4967,16 @@
           </a:p>
         </p:txBody>
       </p:sp>
-      <p:pic>
-        <p:nvPicPr>
-          <p:cNvPr id="257" name="Picture 256"/>
-          <p:cNvPicPr>
-            <a:picLocks noChangeAspect="1"/>
-          </p:cNvPicPr>
-          <p:nvPr/>
-        </p:nvPicPr>
-        <p:blipFill>
-          <a:blip r:embed="rId9"/>
-          <a:stretch>
-            <a:fillRect/>
-          </a:stretch>
-        </p:blipFill>
-        <p:spPr>
-          <a:xfrm>
-            <a:off x="5561609" y="1582706"/>
-            <a:ext cx="232963" cy="172565"/>
-          </a:xfrm>
-          <a:prstGeom prst="rect">
-            <a:avLst/>
-          </a:prstGeom>
-        </p:spPr>
-      </p:pic>
-      <p:grpSp>
-        <p:nvGrpSpPr>
-          <p:cNvPr id="266" name="Group 265"/>
-          <p:cNvGrpSpPr/>
-          <p:nvPr/>
-        </p:nvGrpSpPr>
-        <p:grpSpPr>
-          <a:xfrm>
-            <a:off x="5417832" y="2174679"/>
-            <a:ext cx="101600" cy="101600"/>
-            <a:chOff x="5472583" y="2174679"/>
-            <a:chExt cx="101600" cy="101600"/>
-          </a:xfrm>
-        </p:grpSpPr>
-        <p:cxnSp>
-          <p:nvCxnSpPr>
-            <p:cNvPr id="228" name="Straight Connector 227"/>
-            <p:cNvCxnSpPr/>
-            <p:nvPr/>
-          </p:nvCxnSpPr>
-          <p:spPr>
-            <a:xfrm>
-              <a:off x="5478589" y="2174679"/>
-              <a:ext cx="0" cy="101600"/>
-            </a:xfrm>
-            <a:prstGeom prst="line">
-              <a:avLst/>
-            </a:prstGeom>
-            <a:ln w="19050">
-              <a:solidFill>
-                <a:schemeClr val="tx1"/>
-              </a:solidFill>
-            </a:ln>
-          </p:spPr>
-          <p:style>
-            <a:lnRef idx="1">
-              <a:schemeClr val="accent1"/>
-            </a:lnRef>
-            <a:fillRef idx="0">
-              <a:schemeClr val="accent1"/>
-            </a:fillRef>
-            <a:effectRef idx="0">
-              <a:schemeClr val="accent1"/>
-            </a:effectRef>
-            <a:fontRef idx="minor">
-              <a:schemeClr val="tx1"/>
-            </a:fontRef>
-          </p:style>
-        </p:cxnSp>
-        <p:cxnSp>
-          <p:nvCxnSpPr>
-            <p:cNvPr id="265" name="Straight Connector 264"/>
-            <p:cNvCxnSpPr/>
-            <p:nvPr/>
-          </p:nvCxnSpPr>
-          <p:spPr>
-            <a:xfrm rot="16200000">
-              <a:off x="5523383" y="2219035"/>
-              <a:ext cx="0" cy="101600"/>
-            </a:xfrm>
-            <a:prstGeom prst="line">
-              <a:avLst/>
-            </a:prstGeom>
-            <a:ln w="19050">
-              <a:solidFill>
-                <a:schemeClr val="tx1"/>
-              </a:solidFill>
-            </a:ln>
-          </p:spPr>
-          <p:style>
-            <a:lnRef idx="1">
-              <a:schemeClr val="accent1"/>
-            </a:lnRef>
-            <a:fillRef idx="0">
-              <a:schemeClr val="accent1"/>
-            </a:fillRef>
-            <a:effectRef idx="0">
-              <a:schemeClr val="accent1"/>
-            </a:effectRef>
-            <a:fontRef idx="minor">
-              <a:schemeClr val="tx1"/>
-            </a:fontRef>
-          </p:style>
-        </p:cxnSp>
-      </p:grpSp>
-      <p:grpSp>
-        <p:nvGrpSpPr>
-          <p:cNvPr id="267" name="Group 266"/>
-          <p:cNvGrpSpPr/>
-          <p:nvPr/>
-        </p:nvGrpSpPr>
-        <p:grpSpPr>
-          <a:xfrm>
-            <a:off x="5780782" y="1830270"/>
-            <a:ext cx="101600" cy="101600"/>
-            <a:chOff x="5472583" y="2174679"/>
-            <a:chExt cx="101600" cy="101600"/>
-          </a:xfrm>
-        </p:grpSpPr>
-        <p:cxnSp>
-          <p:nvCxnSpPr>
-            <p:cNvPr id="268" name="Straight Connector 267"/>
-            <p:cNvCxnSpPr/>
-            <p:nvPr/>
-          </p:nvCxnSpPr>
-          <p:spPr>
-            <a:xfrm>
-              <a:off x="5478589" y="2174679"/>
-              <a:ext cx="0" cy="101600"/>
-            </a:xfrm>
-            <a:prstGeom prst="line">
-              <a:avLst/>
-            </a:prstGeom>
-            <a:ln w="19050">
-              <a:solidFill>
-                <a:schemeClr val="tx1"/>
-              </a:solidFill>
-            </a:ln>
-          </p:spPr>
-          <p:style>
-            <a:lnRef idx="1">
-              <a:schemeClr val="accent1"/>
-            </a:lnRef>
-            <a:fillRef idx="0">
-              <a:schemeClr val="accent1"/>
-            </a:fillRef>
-            <a:effectRef idx="0">
-              <a:schemeClr val="accent1"/>
-            </a:effectRef>
-            <a:fontRef idx="minor">
-              <a:schemeClr val="tx1"/>
-            </a:fontRef>
-          </p:style>
-        </p:cxnSp>
-        <p:cxnSp>
-          <p:nvCxnSpPr>
-            <p:cNvPr id="269" name="Straight Connector 268"/>
-            <p:cNvCxnSpPr/>
-            <p:nvPr/>
-          </p:nvCxnSpPr>
-          <p:spPr>
-            <a:xfrm rot="16200000">
-              <a:off x="5523383" y="2219035"/>
-              <a:ext cx="0" cy="101600"/>
-            </a:xfrm>
-            <a:prstGeom prst="line">
-              <a:avLst/>
-            </a:prstGeom>
-            <a:ln w="19050">
-              <a:solidFill>
-                <a:schemeClr val="tx1"/>
-              </a:solidFill>
-            </a:ln>
-          </p:spPr>
-          <p:style>
-            <a:lnRef idx="1">
-              <a:schemeClr val="accent1"/>
-            </a:lnRef>
-            <a:fillRef idx="0">
-              <a:schemeClr val="accent1"/>
-            </a:fillRef>
-            <a:effectRef idx="0">
-              <a:schemeClr val="accent1"/>
-            </a:effectRef>
-            <a:fontRef idx="minor">
-              <a:schemeClr val="tx1"/>
-            </a:fontRef>
-          </p:style>
-        </p:cxnSp>
-      </p:grpSp>
       <p:cxnSp>
         <p:nvCxnSpPr>
-          <p:cNvPr id="271" name="Straight Connector 270"/>
+          <p:cNvPr id="52" name="Straight Connector 51"/>
           <p:cNvCxnSpPr/>
           <p:nvPr/>
         </p:nvCxnSpPr>
         <p:spPr>
-          <a:xfrm rot="5400000">
-            <a:off x="5654903" y="2665606"/>
-            <a:ext cx="251758" cy="0"/>
+          <a:xfrm flipV="1">
+            <a:off x="4470325" y="2055169"/>
+            <a:ext cx="0" cy="657492"/>
           </a:xfrm>
           <a:prstGeom prst="line">
             <a:avLst/>
@@ -4716,16 +5002,40 @@
           </a:fontRef>
         </p:style>
       </p:cxnSp>
+      <p:pic>
+        <p:nvPicPr>
+          <p:cNvPr id="53" name="Picture 52"/>
+          <p:cNvPicPr>
+            <a:picLocks noChangeAspect="1"/>
+          </p:cNvPicPr>
+          <p:nvPr/>
+        </p:nvPicPr>
+        <p:blipFill>
+          <a:blip r:embed="rId10"/>
+          <a:stretch>
+            <a:fillRect/>
+          </a:stretch>
+        </p:blipFill>
+        <p:spPr>
+          <a:xfrm>
+            <a:off x="4330625" y="2819450"/>
+            <a:ext cx="279400" cy="228600"/>
+          </a:xfrm>
+          <a:prstGeom prst="rect">
+            <a:avLst/>
+          </a:prstGeom>
+        </p:spPr>
+      </p:pic>
       <p:cxnSp>
         <p:nvCxnSpPr>
-          <p:cNvPr id="272" name="Straight Connector 271"/>
+          <p:cNvPr id="59" name="Straight Connector 58"/>
           <p:cNvCxnSpPr/>
           <p:nvPr/>
         </p:nvCxnSpPr>
         <p:spPr>
-          <a:xfrm rot="5400000">
-            <a:off x="5633309" y="2487430"/>
-            <a:ext cx="608110" cy="0"/>
+          <a:xfrm>
+            <a:off x="4704889" y="2933750"/>
+            <a:ext cx="666396" cy="0"/>
           </a:xfrm>
           <a:prstGeom prst="line">
             <a:avLst/>

</xml_diff>

<commit_message>
Change shade of orange
</commit_message>
<xml_diff>
--- a/docs/paper/graphics/protocol-composition.pptx
+++ b/docs/paper/graphics/protocol-composition.pptx
@@ -4300,7 +4300,7 @@
                 </a:prstGeom>
                 <a:ln w="19050">
                   <a:solidFill>
-                    <a:srgbClr val="FFC000"/>
+                    <a:schemeClr val="accent2"/>
                   </a:solidFill>
                 </a:ln>
               </p:spPr>
@@ -4335,7 +4335,7 @@
                 </a:prstGeom>
                 <a:ln w="19050">
                   <a:solidFill>
-                    <a:srgbClr val="FFC000"/>
+                    <a:schemeClr val="accent2"/>
                   </a:solidFill>
                 </a:ln>
               </p:spPr>
@@ -4385,7 +4385,7 @@
                 </a:prstGeom>
                 <a:ln w="19050">
                   <a:solidFill>
-                    <a:srgbClr val="FFC000"/>
+                    <a:schemeClr val="accent2"/>
                   </a:solidFill>
                 </a:ln>
               </p:spPr>
@@ -4420,7 +4420,7 @@
                 </a:prstGeom>
                 <a:ln w="19050">
                   <a:solidFill>
-                    <a:srgbClr val="FFC000"/>
+                    <a:schemeClr val="accent2"/>
                   </a:solidFill>
                 </a:ln>
               </p:spPr>

</xml_diff>

<commit_message>
Edit protocol composition diagram and algorithmic typing rules
</commit_message>
<xml_diff>
--- a/docs/paper/graphics/protocol-composition.pptx
+++ b/docs/paper/graphics/protocol-composition.pptx
@@ -3581,176 +3581,122 @@
           </a:fontRef>
         </p:style>
       </p:cxnSp>
-      <p:grpSp>
-        <p:nvGrpSpPr>
-          <p:cNvPr id="24" name="Group 23"/>
-          <p:cNvGrpSpPr/>
+      <p:sp>
+        <p:nvSpPr>
+          <p:cNvPr id="146" name="Rectangle 145"/>
+          <p:cNvSpPr/>
           <p:nvPr/>
-        </p:nvGrpSpPr>
-        <p:grpSpPr>
+        </p:nvSpPr>
+        <p:spPr>
           <a:xfrm>
             <a:off x="3195491" y="1867437"/>
             <a:ext cx="308887" cy="308887"/>
-            <a:chOff x="3325484" y="1931045"/>
-            <a:chExt cx="454654" cy="454654"/>
-          </a:xfrm>
-        </p:grpSpPr>
-        <p:sp>
-          <p:nvSpPr>
-            <p:cNvPr id="146" name="Rectangle 145"/>
-            <p:cNvSpPr/>
-            <p:nvPr/>
-          </p:nvSpPr>
-          <p:spPr>
-            <a:xfrm>
-              <a:off x="3325484" y="1931045"/>
-              <a:ext cx="454654" cy="454654"/>
-            </a:xfrm>
-            <a:prstGeom prst="rect">
-              <a:avLst/>
-            </a:prstGeom>
-            <a:noFill/>
-            <a:ln w="19050">
-              <a:solidFill>
-                <a:schemeClr val="tx1"/>
-              </a:solidFill>
-            </a:ln>
-          </p:spPr>
-          <p:style>
-            <a:lnRef idx="2">
-              <a:schemeClr val="accent1">
-                <a:shade val="50000"/>
-              </a:schemeClr>
-            </a:lnRef>
-            <a:fillRef idx="1">
-              <a:schemeClr val="accent1"/>
-            </a:fillRef>
-            <a:effectRef idx="0">
-              <a:schemeClr val="accent1"/>
-            </a:effectRef>
-            <a:fontRef idx="minor">
-              <a:schemeClr val="lt1"/>
-            </a:fontRef>
-          </p:style>
-          <p:txBody>
-            <a:bodyPr rtlCol="0" anchor="ctr"/>
-            <a:lstStyle/>
-            <a:p>
-              <a:pPr algn="ctr"/>
-              <a:endParaRPr lang="en-US"/>
-            </a:p>
-          </p:txBody>
-        </p:sp>
-        <p:pic>
-          <p:nvPicPr>
-            <p:cNvPr id="19" name="Picture 18"/>
-            <p:cNvPicPr>
-              <a:picLocks noChangeAspect="1"/>
-            </p:cNvPicPr>
-            <p:nvPr/>
-          </p:nvPicPr>
-          <p:blipFill>
-            <a:blip r:embed="rId3"/>
-            <a:stretch>
-              <a:fillRect/>
-            </a:stretch>
-          </p:blipFill>
-          <p:spPr>
-            <a:xfrm>
-              <a:off x="3399162" y="2067288"/>
-              <a:ext cx="304800" cy="203200"/>
-            </a:xfrm>
-            <a:prstGeom prst="rect">
-              <a:avLst/>
-            </a:prstGeom>
-          </p:spPr>
-        </p:pic>
-      </p:grpSp>
-      <p:grpSp>
-        <p:nvGrpSpPr>
-          <p:cNvPr id="41" name="Group 40"/>
-          <p:cNvGrpSpPr/>
+          </a:xfrm>
+          <a:prstGeom prst="rect">
+            <a:avLst/>
+          </a:prstGeom>
+          <a:noFill/>
+          <a:ln w="19050">
+            <a:solidFill>
+              <a:schemeClr val="tx1"/>
+            </a:solidFill>
+          </a:ln>
+        </p:spPr>
+        <p:style>
+          <a:lnRef idx="2">
+            <a:schemeClr val="accent1">
+              <a:shade val="50000"/>
+            </a:schemeClr>
+          </a:lnRef>
+          <a:fillRef idx="1">
+            <a:schemeClr val="accent1"/>
+          </a:fillRef>
+          <a:effectRef idx="0">
+            <a:schemeClr val="accent1"/>
+          </a:effectRef>
+          <a:fontRef idx="minor">
+            <a:schemeClr val="lt1"/>
+          </a:fontRef>
+        </p:style>
+        <p:txBody>
+          <a:bodyPr rtlCol="0" anchor="ctr"/>
+          <a:lstStyle/>
+          <a:p>
+            <a:pPr algn="ctr"/>
+            <a:endParaRPr lang="en-US"/>
+          </a:p>
+        </p:txBody>
+      </p:sp>
+      <p:sp>
+        <p:nvSpPr>
+          <p:cNvPr id="90" name="Rectangle 89"/>
+          <p:cNvSpPr/>
           <p:nvPr/>
-        </p:nvGrpSpPr>
-        <p:grpSpPr>
+        </p:nvSpPr>
+        <p:spPr>
           <a:xfrm>
             <a:off x="3321553" y="2704839"/>
             <a:ext cx="454654" cy="454654"/>
-            <a:chOff x="3660920" y="3091199"/>
-            <a:chExt cx="454654" cy="454654"/>
-          </a:xfrm>
-        </p:grpSpPr>
-        <p:sp>
-          <p:nvSpPr>
-            <p:cNvPr id="90" name="Rectangle 89"/>
-            <p:cNvSpPr/>
-            <p:nvPr/>
-          </p:nvSpPr>
-          <p:spPr>
-            <a:xfrm>
-              <a:off x="3660920" y="3091199"/>
-              <a:ext cx="454654" cy="454654"/>
-            </a:xfrm>
-            <a:prstGeom prst="rect">
-              <a:avLst/>
-            </a:prstGeom>
-            <a:noFill/>
-            <a:ln w="19050">
-              <a:solidFill>
-                <a:schemeClr val="tx1"/>
-              </a:solidFill>
-            </a:ln>
-          </p:spPr>
-          <p:style>
-            <a:lnRef idx="2">
-              <a:schemeClr val="accent1">
-                <a:shade val="50000"/>
-              </a:schemeClr>
-            </a:lnRef>
-            <a:fillRef idx="1">
-              <a:schemeClr val="accent1"/>
-            </a:fillRef>
-            <a:effectRef idx="0">
-              <a:schemeClr val="accent1"/>
-            </a:effectRef>
-            <a:fontRef idx="minor">
-              <a:schemeClr val="lt1"/>
-            </a:fontRef>
-          </p:style>
-          <p:txBody>
-            <a:bodyPr rtlCol="0" anchor="ctr"/>
-            <a:lstStyle/>
-            <a:p>
-              <a:pPr algn="ctr"/>
-              <a:endParaRPr lang="en-US"/>
-            </a:p>
-          </p:txBody>
-        </p:sp>
-        <p:pic>
-          <p:nvPicPr>
-            <p:cNvPr id="34" name="Picture 33"/>
-            <p:cNvPicPr>
-              <a:picLocks noChangeAspect="1"/>
-            </p:cNvPicPr>
-            <p:nvPr/>
-          </p:nvPicPr>
-          <p:blipFill>
-            <a:blip r:embed="rId4"/>
-            <a:stretch>
-              <a:fillRect/>
-            </a:stretch>
-          </p:blipFill>
-          <p:spPr>
-            <a:xfrm>
-              <a:off x="3731369" y="3178826"/>
-              <a:ext cx="304800" cy="279400"/>
-            </a:xfrm>
-            <a:prstGeom prst="rect">
-              <a:avLst/>
-            </a:prstGeom>
-          </p:spPr>
-        </p:pic>
-      </p:grpSp>
+          </a:xfrm>
+          <a:prstGeom prst="rect">
+            <a:avLst/>
+          </a:prstGeom>
+          <a:noFill/>
+          <a:ln w="19050">
+            <a:solidFill>
+              <a:schemeClr val="tx1"/>
+            </a:solidFill>
+          </a:ln>
+        </p:spPr>
+        <p:style>
+          <a:lnRef idx="2">
+            <a:schemeClr val="accent1">
+              <a:shade val="50000"/>
+            </a:schemeClr>
+          </a:lnRef>
+          <a:fillRef idx="1">
+            <a:schemeClr val="accent1"/>
+          </a:fillRef>
+          <a:effectRef idx="0">
+            <a:schemeClr val="accent1"/>
+          </a:effectRef>
+          <a:fontRef idx="minor">
+            <a:schemeClr val="lt1"/>
+          </a:fontRef>
+        </p:style>
+        <p:txBody>
+          <a:bodyPr rtlCol="0" anchor="ctr"/>
+          <a:lstStyle/>
+          <a:p>
+            <a:pPr algn="ctr"/>
+            <a:endParaRPr lang="en-US"/>
+          </a:p>
+        </p:txBody>
+      </p:sp>
+      <p:pic>
+        <p:nvPicPr>
+          <p:cNvPr id="34" name="Picture 33"/>
+          <p:cNvPicPr>
+            <a:picLocks noChangeAspect="1"/>
+          </p:cNvPicPr>
+          <p:nvPr/>
+        </p:nvPicPr>
+        <p:blipFill>
+          <a:blip r:embed="rId3"/>
+          <a:stretch>
+            <a:fillRect/>
+          </a:stretch>
+        </p:blipFill>
+        <p:spPr>
+          <a:xfrm>
+            <a:off x="5447933" y="2802097"/>
+            <a:ext cx="304800" cy="279400"/>
+          </a:xfrm>
+          <a:prstGeom prst="rect">
+            <a:avLst/>
+          </a:prstGeom>
+        </p:spPr>
+      </p:pic>
       <p:cxnSp>
         <p:nvCxnSpPr>
           <p:cNvPr id="199" name="Straight Connector 198"/>
@@ -3821,91 +3767,52 @@
           </a:fontRef>
         </p:style>
       </p:cxnSp>
-      <p:grpSp>
-        <p:nvGrpSpPr>
-          <p:cNvPr id="244" name="Group 243"/>
-          <p:cNvGrpSpPr/>
+      <p:sp>
+        <p:nvSpPr>
+          <p:cNvPr id="245" name="Rectangle 244"/>
+          <p:cNvSpPr/>
           <p:nvPr/>
-        </p:nvGrpSpPr>
-        <p:grpSpPr>
+        </p:nvSpPr>
+        <p:spPr>
           <a:xfrm>
             <a:off x="3558995" y="1511133"/>
             <a:ext cx="308887" cy="308887"/>
-            <a:chOff x="3995083" y="1265666"/>
-            <a:chExt cx="454654" cy="454654"/>
-          </a:xfrm>
-        </p:grpSpPr>
-        <p:sp>
-          <p:nvSpPr>
-            <p:cNvPr id="245" name="Rectangle 244"/>
-            <p:cNvSpPr/>
-            <p:nvPr/>
-          </p:nvSpPr>
-          <p:spPr>
-            <a:xfrm>
-              <a:off x="3995083" y="1265666"/>
-              <a:ext cx="454654" cy="454654"/>
-            </a:xfrm>
-            <a:prstGeom prst="rect">
-              <a:avLst/>
-            </a:prstGeom>
-            <a:noFill/>
-            <a:ln w="19050">
-              <a:solidFill>
-                <a:schemeClr val="tx1"/>
-              </a:solidFill>
-            </a:ln>
-          </p:spPr>
-          <p:style>
-            <a:lnRef idx="2">
-              <a:schemeClr val="accent1">
-                <a:shade val="50000"/>
-              </a:schemeClr>
-            </a:lnRef>
-            <a:fillRef idx="1">
-              <a:schemeClr val="accent1"/>
-            </a:fillRef>
-            <a:effectRef idx="0">
-              <a:schemeClr val="accent1"/>
-            </a:effectRef>
-            <a:fontRef idx="minor">
-              <a:schemeClr val="lt1"/>
-            </a:fontRef>
-          </p:style>
-          <p:txBody>
-            <a:bodyPr rtlCol="0" anchor="ctr"/>
-            <a:lstStyle/>
-            <a:p>
-              <a:pPr algn="ctr"/>
-              <a:endParaRPr lang="en-US"/>
-            </a:p>
-          </p:txBody>
-        </p:sp>
-        <p:pic>
-          <p:nvPicPr>
-            <p:cNvPr id="246" name="Picture 245"/>
-            <p:cNvPicPr>
-              <a:picLocks noChangeAspect="1"/>
-            </p:cNvPicPr>
-            <p:nvPr/>
-          </p:nvPicPr>
-          <p:blipFill>
-            <a:blip r:embed="rId5"/>
-            <a:stretch>
-              <a:fillRect/>
-            </a:stretch>
-          </p:blipFill>
-          <p:spPr>
-            <a:xfrm>
-              <a:off x="4057279" y="1387024"/>
-              <a:ext cx="342901" cy="254000"/>
-            </a:xfrm>
-            <a:prstGeom prst="rect">
-              <a:avLst/>
-            </a:prstGeom>
-          </p:spPr>
-        </p:pic>
-      </p:grpSp>
+          </a:xfrm>
+          <a:prstGeom prst="rect">
+            <a:avLst/>
+          </a:prstGeom>
+          <a:noFill/>
+          <a:ln w="19050">
+            <a:solidFill>
+              <a:schemeClr val="tx1"/>
+            </a:solidFill>
+          </a:ln>
+        </p:spPr>
+        <p:style>
+          <a:lnRef idx="2">
+            <a:schemeClr val="accent1">
+              <a:shade val="50000"/>
+            </a:schemeClr>
+          </a:lnRef>
+          <a:fillRef idx="1">
+            <a:schemeClr val="accent1"/>
+          </a:fillRef>
+          <a:effectRef idx="0">
+            <a:schemeClr val="accent1"/>
+          </a:effectRef>
+          <a:fontRef idx="minor">
+            <a:schemeClr val="lt1"/>
+          </a:fontRef>
+        </p:style>
+        <p:txBody>
+          <a:bodyPr rtlCol="0" anchor="ctr"/>
+          <a:lstStyle/>
+          <a:p>
+            <a:pPr algn="ctr"/>
+            <a:endParaRPr lang="en-US"/>
+          </a:p>
+        </p:txBody>
+      </p:sp>
       <p:grpSp>
         <p:nvGrpSpPr>
           <p:cNvPr id="196" name="Group 195"/>
@@ -3929,7 +3836,7 @@
             <p:nvPr/>
           </p:nvPicPr>
           <p:blipFill>
-            <a:blip r:embed="rId6"/>
+            <a:blip r:embed="rId4"/>
             <a:stretch>
               <a:fillRect/>
             </a:stretch>
@@ -4014,7 +3921,7 @@
             <p:nvPr/>
           </p:nvPicPr>
           <p:blipFill>
-            <a:blip r:embed="rId6"/>
+            <a:blip r:embed="rId4"/>
             <a:stretch>
               <a:fillRect/>
             </a:stretch>
@@ -4085,7 +3992,7 @@
           <p:nvPr/>
         </p:nvPicPr>
         <p:blipFill>
-          <a:blip r:embed="rId3"/>
+          <a:blip r:embed="rId5"/>
           <a:stretch>
             <a:fillRect/>
           </a:stretch>
@@ -4144,7 +4051,7 @@
           <p:nvPr/>
         </p:nvPicPr>
         <p:blipFill>
-          <a:blip r:embed="rId7"/>
+          <a:blip r:embed="rId6"/>
           <a:stretch>
             <a:fillRect/>
           </a:stretch>
@@ -4168,7 +4075,7 @@
           <p:nvPr/>
         </p:nvPicPr>
         <p:blipFill>
-          <a:blip r:embed="rId8"/>
+          <a:blip r:embed="rId7"/>
           <a:stretch>
             <a:fillRect/>
           </a:stretch>
@@ -4227,7 +4134,7 @@
           <p:nvPr/>
         </p:nvPicPr>
         <p:blipFill>
-          <a:blip r:embed="rId5"/>
+          <a:blip r:embed="rId8"/>
           <a:stretch>
             <a:fillRect/>
           </a:stretch>
@@ -4620,91 +4527,52 @@
           </a:p>
         </p:txBody>
       </p:sp>
-      <p:grpSp>
-        <p:nvGrpSpPr>
-          <p:cNvPr id="273" name="Group 272"/>
-          <p:cNvGrpSpPr/>
+      <p:sp>
+        <p:nvSpPr>
+          <p:cNvPr id="211" name="Rectangle 210"/>
+          <p:cNvSpPr/>
           <p:nvPr/>
-        </p:nvGrpSpPr>
-        <p:grpSpPr>
+        </p:nvSpPr>
+        <p:spPr>
           <a:xfrm>
             <a:off x="5373007" y="2707254"/>
             <a:ext cx="454654" cy="454654"/>
-            <a:chOff x="5793284" y="3237532"/>
-            <a:chExt cx="454654" cy="454654"/>
-          </a:xfrm>
-        </p:grpSpPr>
-        <p:sp>
-          <p:nvSpPr>
-            <p:cNvPr id="211" name="Rectangle 210"/>
-            <p:cNvSpPr/>
-            <p:nvPr/>
-          </p:nvSpPr>
-          <p:spPr>
-            <a:xfrm>
-              <a:off x="5793284" y="3237532"/>
-              <a:ext cx="454654" cy="454654"/>
-            </a:xfrm>
-            <a:prstGeom prst="rect">
-              <a:avLst/>
-            </a:prstGeom>
-            <a:noFill/>
-            <a:ln w="19050">
-              <a:solidFill>
-                <a:schemeClr val="tx1"/>
-              </a:solidFill>
-            </a:ln>
-          </p:spPr>
-          <p:style>
-            <a:lnRef idx="2">
-              <a:schemeClr val="accent1">
-                <a:shade val="50000"/>
-              </a:schemeClr>
-            </a:lnRef>
-            <a:fillRef idx="1">
-              <a:schemeClr val="accent1"/>
-            </a:fillRef>
-            <a:effectRef idx="0">
-              <a:schemeClr val="accent1"/>
-            </a:effectRef>
-            <a:fontRef idx="minor">
-              <a:schemeClr val="lt1"/>
-            </a:fontRef>
-          </p:style>
-          <p:txBody>
-            <a:bodyPr rtlCol="0" anchor="ctr"/>
-            <a:lstStyle/>
-            <a:p>
-              <a:pPr algn="ctr"/>
-              <a:endParaRPr lang="en-US"/>
-            </a:p>
-          </p:txBody>
-        </p:sp>
-        <p:pic>
-          <p:nvPicPr>
-            <p:cNvPr id="57" name="Picture 56"/>
-            <p:cNvPicPr>
-              <a:picLocks noChangeAspect="1"/>
-            </p:cNvPicPr>
-            <p:nvPr/>
-          </p:nvPicPr>
-          <p:blipFill>
-            <a:blip r:embed="rId9"/>
-            <a:stretch>
-              <a:fillRect/>
-            </a:stretch>
-          </p:blipFill>
-          <p:spPr>
-            <a:xfrm>
-              <a:off x="5856225" y="3314821"/>
-              <a:ext cx="317500" cy="292100"/>
-            </a:xfrm>
-            <a:prstGeom prst="rect">
-              <a:avLst/>
-            </a:prstGeom>
-          </p:spPr>
-        </p:pic>
-      </p:grpSp>
+          </a:xfrm>
+          <a:prstGeom prst="rect">
+            <a:avLst/>
+          </a:prstGeom>
+          <a:noFill/>
+          <a:ln w="19050">
+            <a:solidFill>
+              <a:schemeClr val="tx1"/>
+            </a:solidFill>
+          </a:ln>
+        </p:spPr>
+        <p:style>
+          <a:lnRef idx="2">
+            <a:schemeClr val="accent1">
+              <a:shade val="50000"/>
+            </a:schemeClr>
+          </a:lnRef>
+          <a:fillRef idx="1">
+            <a:schemeClr val="accent1"/>
+          </a:fillRef>
+          <a:effectRef idx="0">
+            <a:schemeClr val="accent1"/>
+          </a:effectRef>
+          <a:fontRef idx="minor">
+            <a:schemeClr val="lt1"/>
+          </a:fontRef>
+        </p:style>
+        <p:txBody>
+          <a:bodyPr rtlCol="0" anchor="ctr"/>
+          <a:lstStyle/>
+          <a:p>
+            <a:pPr algn="ctr"/>
+            <a:endParaRPr lang="en-US"/>
+          </a:p>
+        </p:txBody>
+      </p:sp>
       <p:sp>
         <p:nvSpPr>
           <p:cNvPr id="224" name="Rectangle 223"/>
@@ -4876,7 +4744,7 @@
           <p:nvPr/>
         </p:nvPicPr>
         <p:blipFill>
-          <a:blip r:embed="rId10"/>
+          <a:blip r:embed="rId9"/>
           <a:stretch>
             <a:fillRect/>
           </a:stretch>
@@ -4981,7 +4849,7 @@
           <p:nvPr/>
         </p:nvPicPr>
         <p:blipFill>
-          <a:blip r:embed="rId10"/>
+          <a:blip r:embed="rId9"/>
           <a:stretch>
             <a:fillRect/>
           </a:stretch>
@@ -5031,6 +4899,78 @@
           </a:fontRef>
         </p:style>
       </p:cxnSp>
+      <p:pic>
+        <p:nvPicPr>
+          <p:cNvPr id="54" name="Picture 53"/>
+          <p:cNvPicPr>
+            <a:picLocks noChangeAspect="1"/>
+          </p:cNvPicPr>
+          <p:nvPr/>
+        </p:nvPicPr>
+        <p:blipFill>
+          <a:blip r:embed="rId6"/>
+          <a:stretch>
+            <a:fillRect/>
+          </a:stretch>
+        </p:blipFill>
+        <p:spPr>
+          <a:xfrm>
+            <a:off x="3243648" y="1961542"/>
+            <a:ext cx="207078" cy="155308"/>
+          </a:xfrm>
+          <a:prstGeom prst="rect">
+            <a:avLst/>
+          </a:prstGeom>
+        </p:spPr>
+      </p:pic>
+      <p:pic>
+        <p:nvPicPr>
+          <p:cNvPr id="55" name="Picture 54"/>
+          <p:cNvPicPr>
+            <a:picLocks noChangeAspect="1"/>
+          </p:cNvPicPr>
+          <p:nvPr/>
+        </p:nvPicPr>
+        <p:blipFill>
+          <a:blip r:embed="rId7"/>
+          <a:stretch>
+            <a:fillRect/>
+          </a:stretch>
+        </p:blipFill>
+        <p:spPr>
+          <a:xfrm>
+            <a:off x="3591133" y="1592044"/>
+            <a:ext cx="232963" cy="181193"/>
+          </a:xfrm>
+          <a:prstGeom prst="rect">
+            <a:avLst/>
+          </a:prstGeom>
+        </p:spPr>
+      </p:pic>
+      <p:pic>
+        <p:nvPicPr>
+          <p:cNvPr id="2" name="Picture 1"/>
+          <p:cNvPicPr>
+            <a:picLocks noChangeAspect="1"/>
+          </p:cNvPicPr>
+          <p:nvPr/>
+        </p:nvPicPr>
+        <p:blipFill>
+          <a:blip r:embed="rId10"/>
+          <a:stretch>
+            <a:fillRect/>
+          </a:stretch>
+        </p:blipFill>
+        <p:spPr>
+          <a:xfrm>
+            <a:off x="3379287" y="2786228"/>
+            <a:ext cx="304800" cy="279400"/>
+          </a:xfrm>
+          <a:prstGeom prst="rect">
+            <a:avLst/>
+          </a:prstGeom>
+        </p:spPr>
+      </p:pic>
     </p:spTree>
     <p:extLst>
       <p:ext uri="{BB962C8B-B14F-4D97-AF65-F5344CB8AC3E}">

</xml_diff>